<commit_message>
Added ppt and completed models in Code/
</commit_message>
<xml_diff>
--- a/powerpoint_presentation.pptx
+++ b/powerpoint_presentation.pptx
@@ -5,19 +5,16 @@
     <p:sldMasterId id="2147483768" r:id="rId4"/>
   </p:sldMasterIdLst>
   <p:notesMasterIdLst>
-    <p:notesMasterId r:id="rId15"/>
+    <p:notesMasterId r:id="rId12"/>
   </p:notesMasterIdLst>
   <p:sldIdLst>
     <p:sldId id="3825" r:id="rId5"/>
     <p:sldId id="3827" r:id="rId6"/>
     <p:sldId id="3835" r:id="rId7"/>
-    <p:sldId id="3828" r:id="rId8"/>
-    <p:sldId id="3791" r:id="rId9"/>
-    <p:sldId id="3836" r:id="rId10"/>
+    <p:sldId id="3839" r:id="rId8"/>
+    <p:sldId id="3828" r:id="rId9"/>
+    <p:sldId id="3791" r:id="rId10"/>
     <p:sldId id="3837" r:id="rId11"/>
-    <p:sldId id="3838" r:id="rId12"/>
-    <p:sldId id="3833" r:id="rId13"/>
-    <p:sldId id="3834" r:id="rId14"/>
   </p:sldIdLst>
   <p:sldSz cx="12192000" cy="6858000"/>
   <p:notesSz cx="6858000" cy="9144000"/>
@@ -498,6 +495,194 @@
     </a:lvl9pPr>
   </p:notesStyle>
 </p:notesMaster>
+</file>
+
+<file path=ppt/notesSlides/notesSlide1.xml><?xml version="1.0" encoding="utf-8"?>
+<p:notes xmlns:a="http://schemas.openxmlformats.org/drawingml/2006/main" xmlns:r="http://schemas.openxmlformats.org/officeDocument/2006/relationships" xmlns:p="http://schemas.openxmlformats.org/presentationml/2006/main">
+  <p:cSld>
+    <p:spTree>
+      <p:nvGrpSpPr>
+        <p:cNvPr id="1" name=""/>
+        <p:cNvGrpSpPr/>
+        <p:nvPr/>
+      </p:nvGrpSpPr>
+      <p:grpSpPr>
+        <a:xfrm>
+          <a:off x="0" y="0"/>
+          <a:ext cx="0" cy="0"/>
+          <a:chOff x="0" y="0"/>
+          <a:chExt cx="0" cy="0"/>
+        </a:xfrm>
+      </p:grpSpPr>
+      <p:sp>
+        <p:nvSpPr>
+          <p:cNvPr id="2" name="Slide Image Placeholder 1"/>
+          <p:cNvSpPr>
+            <a:spLocks noGrp="1" noRot="1" noChangeAspect="1"/>
+          </p:cNvSpPr>
+          <p:nvPr>
+            <p:ph type="sldImg"/>
+          </p:nvPr>
+        </p:nvSpPr>
+        <p:spPr/>
+      </p:sp>
+      <p:sp>
+        <p:nvSpPr>
+          <p:cNvPr id="3" name="Notes Placeholder 2"/>
+          <p:cNvSpPr>
+            <a:spLocks noGrp="1"/>
+          </p:cNvSpPr>
+          <p:nvPr>
+            <p:ph type="body" idx="1"/>
+          </p:nvPr>
+        </p:nvSpPr>
+        <p:spPr/>
+        <p:txBody>
+          <a:bodyPr/>
+          <a:lstStyle/>
+          <a:p>
+            <a:r>
+              <a:rPr lang="en-US" b="0" i="0" u="none" strike="noStrike" dirty="0">
+                <a:solidFill>
+                  <a:srgbClr val="D1D5DB"/>
+                </a:solidFill>
+                <a:effectLst/>
+                <a:latin typeface="Söhne"/>
+              </a:rPr>
+              <a:t>A high accuracy but a low AUC can can occur when the model is correctly . This can happen when the model is heavily skewed towards one class, and is not able to accurately predict the other class. In this situation, the model may have a high overall accuracy because it is predicting the majority class most of the time, but its AUC will be low because it is not able to accurately distinguish between the two classes</a:t>
+            </a:r>
+            <a:endParaRPr lang="en-US" dirty="0"/>
+          </a:p>
+        </p:txBody>
+      </p:sp>
+      <p:sp>
+        <p:nvSpPr>
+          <p:cNvPr id="4" name="Slide Number Placeholder 3"/>
+          <p:cNvSpPr>
+            <a:spLocks noGrp="1"/>
+          </p:cNvSpPr>
+          <p:nvPr>
+            <p:ph type="sldNum" sz="quarter" idx="5"/>
+          </p:nvPr>
+        </p:nvSpPr>
+        <p:spPr/>
+        <p:txBody>
+          <a:bodyPr/>
+          <a:lstStyle/>
+          <a:p>
+            <a:fld id="{D40C6A29-4676-420C-BBE3-ACC2B80F64D4}" type="slidenum">
+              <a:rPr lang="en-US" smtClean="0"/>
+              <a:t>6</a:t>
+            </a:fld>
+            <a:endParaRPr lang="en-US" dirty="0"/>
+          </a:p>
+        </p:txBody>
+      </p:sp>
+    </p:spTree>
+    <p:extLst>
+      <p:ext uri="{BB962C8B-B14F-4D97-AF65-F5344CB8AC3E}">
+        <p14:creationId xmlns:p14="http://schemas.microsoft.com/office/powerpoint/2010/main" val="3217521170"/>
+      </p:ext>
+    </p:extLst>
+  </p:cSld>
+  <p:clrMapOvr>
+    <a:masterClrMapping/>
+  </p:clrMapOvr>
+</p:notes>
+</file>
+
+<file path=ppt/notesSlides/notesSlide2.xml><?xml version="1.0" encoding="utf-8"?>
+<p:notes xmlns:a="http://schemas.openxmlformats.org/drawingml/2006/main" xmlns:r="http://schemas.openxmlformats.org/officeDocument/2006/relationships" xmlns:p="http://schemas.openxmlformats.org/presentationml/2006/main">
+  <p:cSld>
+    <p:spTree>
+      <p:nvGrpSpPr>
+        <p:cNvPr id="1" name=""/>
+        <p:cNvGrpSpPr/>
+        <p:nvPr/>
+      </p:nvGrpSpPr>
+      <p:grpSpPr>
+        <a:xfrm>
+          <a:off x="0" y="0"/>
+          <a:ext cx="0" cy="0"/>
+          <a:chOff x="0" y="0"/>
+          <a:chExt cx="0" cy="0"/>
+        </a:xfrm>
+      </p:grpSpPr>
+      <p:sp>
+        <p:nvSpPr>
+          <p:cNvPr id="2" name="Slide Image Placeholder 1"/>
+          <p:cNvSpPr>
+            <a:spLocks noGrp="1" noRot="1" noChangeAspect="1"/>
+          </p:cNvSpPr>
+          <p:nvPr>
+            <p:ph type="sldImg"/>
+          </p:nvPr>
+        </p:nvSpPr>
+        <p:spPr/>
+      </p:sp>
+      <p:sp>
+        <p:nvSpPr>
+          <p:cNvPr id="3" name="Notes Placeholder 2"/>
+          <p:cNvSpPr>
+            <a:spLocks noGrp="1"/>
+          </p:cNvSpPr>
+          <p:nvPr>
+            <p:ph type="body" idx="1"/>
+          </p:nvPr>
+        </p:nvSpPr>
+        <p:spPr/>
+        <p:txBody>
+          <a:bodyPr/>
+          <a:lstStyle/>
+          <a:p>
+            <a:r>
+              <a:rPr lang="en-US" b="0" i="0" u="none" strike="noStrike" dirty="0">
+                <a:solidFill>
+                  <a:srgbClr val="D1D5DB"/>
+                </a:solidFill>
+                <a:effectLst/>
+                <a:latin typeface="Söhne"/>
+              </a:rPr>
+              <a:t>It is a measure of how well each point in a cluster is classified, based on the average distance between that point and all other points in the same cluster, and the average distance between that point and all other points in the nearest neighboring cluster. A high silhouette score indicates that points in the same cluster are similar to each other, and points in different clusters are dissimilar. This is because in our data set </a:t>
+            </a:r>
+            <a:endParaRPr lang="en-US" dirty="0"/>
+          </a:p>
+        </p:txBody>
+      </p:sp>
+      <p:sp>
+        <p:nvSpPr>
+          <p:cNvPr id="4" name="Slide Number Placeholder 3"/>
+          <p:cNvSpPr>
+            <a:spLocks noGrp="1"/>
+          </p:cNvSpPr>
+          <p:nvPr>
+            <p:ph type="sldNum" sz="quarter" idx="5"/>
+          </p:nvPr>
+        </p:nvSpPr>
+        <p:spPr/>
+        <p:txBody>
+          <a:bodyPr/>
+          <a:lstStyle/>
+          <a:p>
+            <a:fld id="{D40C6A29-4676-420C-BBE3-ACC2B80F64D4}" type="slidenum">
+              <a:rPr lang="en-US" smtClean="0"/>
+              <a:t>7</a:t>
+            </a:fld>
+            <a:endParaRPr lang="en-US" dirty="0"/>
+          </a:p>
+        </p:txBody>
+      </p:sp>
+    </p:spTree>
+    <p:extLst>
+      <p:ext uri="{BB962C8B-B14F-4D97-AF65-F5344CB8AC3E}">
+        <p14:creationId xmlns:p14="http://schemas.microsoft.com/office/powerpoint/2010/main" val="755298862"/>
+      </p:ext>
+    </p:extLst>
+  </p:cSld>
+  <p:clrMapOvr>
+    <a:masterClrMapping/>
+  </p:clrMapOvr>
+</p:notes>
 </file>
 
 <file path=ppt/slideLayouts/slideLayout1.xml><?xml version="1.0" encoding="utf-8"?>
@@ -11710,152 +11895,6 @@
 </p:sld>
 </file>
 
-<file path=ppt/slides/slide10.xml><?xml version="1.0" encoding="utf-8"?>
-<p:sld xmlns:a="http://schemas.openxmlformats.org/drawingml/2006/main" xmlns:r="http://schemas.openxmlformats.org/officeDocument/2006/relationships" xmlns:p="http://schemas.openxmlformats.org/presentationml/2006/main">
-  <p:cSld>
-    <p:spTree>
-      <p:nvGrpSpPr>
-        <p:cNvPr id="1" name=""/>
-        <p:cNvGrpSpPr/>
-        <p:nvPr/>
-      </p:nvGrpSpPr>
-      <p:grpSpPr>
-        <a:xfrm>
-          <a:off x="0" y="0"/>
-          <a:ext cx="0" cy="0"/>
-          <a:chOff x="0" y="0"/>
-          <a:chExt cx="0" cy="0"/>
-        </a:xfrm>
-      </p:grpSpPr>
-      <p:sp>
-        <p:nvSpPr>
-          <p:cNvPr id="2" name="Title 1">
-            <a:extLst>
-              <a:ext uri="{FF2B5EF4-FFF2-40B4-BE49-F238E27FC236}">
-                <a16:creationId xmlns:a16="http://schemas.microsoft.com/office/drawing/2014/main" id="{659706C9-F26D-46CA-93BF-8C27012F6B12}"/>
-              </a:ext>
-            </a:extLst>
-          </p:cNvPr>
-          <p:cNvSpPr>
-            <a:spLocks noGrp="1"/>
-          </p:cNvSpPr>
-          <p:nvPr>
-            <p:ph type="title"/>
-          </p:nvPr>
-        </p:nvSpPr>
-        <p:spPr/>
-        <p:txBody>
-          <a:bodyPr/>
-          <a:lstStyle/>
-          <a:p>
-            <a:r>
-              <a:rPr lang="en-US" dirty="0"/>
-              <a:t>Thank you</a:t>
-            </a:r>
-          </a:p>
-        </p:txBody>
-      </p:sp>
-      <p:sp>
-        <p:nvSpPr>
-          <p:cNvPr id="5" name="Footer Placeholder 4">
-            <a:extLst>
-              <a:ext uri="{FF2B5EF4-FFF2-40B4-BE49-F238E27FC236}">
-                <a16:creationId xmlns:a16="http://schemas.microsoft.com/office/drawing/2014/main" id="{C75D06EF-9416-46F7-8230-B49EE1269F53}"/>
-              </a:ext>
-            </a:extLst>
-          </p:cNvPr>
-          <p:cNvSpPr>
-            <a:spLocks noGrp="1"/>
-          </p:cNvSpPr>
-          <p:nvPr>
-            <p:ph type="ftr" sz="quarter" idx="11"/>
-          </p:nvPr>
-        </p:nvSpPr>
-        <p:spPr/>
-        <p:txBody>
-          <a:bodyPr/>
-          <a:lstStyle/>
-          <a:p>
-            <a:pPr lvl="0"/>
-            <a:r>
-              <a:rPr lang="en-US" noProof="0" dirty="0"/>
-              <a:t>Presentation Title</a:t>
-            </a:r>
-          </a:p>
-        </p:txBody>
-      </p:sp>
-      <p:sp>
-        <p:nvSpPr>
-          <p:cNvPr id="6" name="Slide Number Placeholder 5">
-            <a:extLst>
-              <a:ext uri="{FF2B5EF4-FFF2-40B4-BE49-F238E27FC236}">
-                <a16:creationId xmlns:a16="http://schemas.microsoft.com/office/drawing/2014/main" id="{7359025F-68D1-4F50-8480-3F981455D4DE}"/>
-              </a:ext>
-            </a:extLst>
-          </p:cNvPr>
-          <p:cNvSpPr>
-            <a:spLocks noGrp="1"/>
-          </p:cNvSpPr>
-          <p:nvPr>
-            <p:ph type="sldNum" sz="quarter" idx="12"/>
-          </p:nvPr>
-        </p:nvSpPr>
-        <p:spPr/>
-        <p:txBody>
-          <a:bodyPr/>
-          <a:lstStyle/>
-          <a:p>
-            <a:pPr lvl="0"/>
-            <a:fld id="{D76B855D-E9CC-4FF8-AD85-6CDC7B89A0DE}" type="slidenum">
-              <a:rPr lang="en-US" noProof="0" smtClean="0"/>
-              <a:pPr lvl="0"/>
-              <a:t>10</a:t>
-            </a:fld>
-            <a:endParaRPr lang="en-US" noProof="0" dirty="0"/>
-          </a:p>
-        </p:txBody>
-      </p:sp>
-      <p:sp>
-        <p:nvSpPr>
-          <p:cNvPr id="3" name="Content Placeholder 2">
-            <a:extLst>
-              <a:ext uri="{FF2B5EF4-FFF2-40B4-BE49-F238E27FC236}">
-                <a16:creationId xmlns:a16="http://schemas.microsoft.com/office/drawing/2014/main" id="{21F0B6E0-1F7C-4E6A-87B1-554ADE739CD1}"/>
-              </a:ext>
-            </a:extLst>
-          </p:cNvPr>
-          <p:cNvSpPr>
-            <a:spLocks noGrp="1"/>
-          </p:cNvSpPr>
-          <p:nvPr>
-            <p:ph idx="1"/>
-          </p:nvPr>
-        </p:nvSpPr>
-        <p:spPr/>
-        <p:txBody>
-          <a:bodyPr/>
-          <a:lstStyle/>
-          <a:p>
-            <a:r>
-              <a:rPr lang="en-US" dirty="0"/>
-              <a:t>Gilberto Arellano</a:t>
-            </a:r>
-          </a:p>
-        </p:txBody>
-      </p:sp>
-    </p:spTree>
-    <p:extLst>
-      <p:ext uri="{BB962C8B-B14F-4D97-AF65-F5344CB8AC3E}">
-        <p14:creationId xmlns:p14="http://schemas.microsoft.com/office/powerpoint/2010/main" val="962258905"/>
-      </p:ext>
-    </p:extLst>
-  </p:cSld>
-  <p:clrMapOvr>
-    <a:masterClrMapping/>
-  </p:clrMapOvr>
-</p:sld>
-</file>
-
 <file path=ppt/slides/slide2.xml><?xml version="1.0" encoding="utf-8"?>
 <p:sld xmlns:a="http://schemas.openxmlformats.org/drawingml/2006/main" xmlns:r="http://schemas.openxmlformats.org/officeDocument/2006/relationships" xmlns:p="http://schemas.openxmlformats.org/presentationml/2006/main">
   <p:cSld>
@@ -13906,10 +13945,10 @@
       </p:grpSpPr>
       <p:sp>
         <p:nvSpPr>
-          <p:cNvPr id="2" name="Title 1">
-            <a:extLst>
-              <a:ext uri="{FF2B5EF4-FFF2-40B4-BE49-F238E27FC236}">
-                <a16:creationId xmlns:a16="http://schemas.microsoft.com/office/drawing/2014/main" id="{1EFC037F-9B04-45A9-8AE6-A8517884947F}"/>
+          <p:cNvPr id="4" name="Title 3">
+            <a:extLst>
+              <a:ext uri="{FF2B5EF4-FFF2-40B4-BE49-F238E27FC236}">
+                <a16:creationId xmlns:a16="http://schemas.microsoft.com/office/drawing/2014/main" id="{7B290457-2071-4F7C-9327-CE85A282B4D5}"/>
               </a:ext>
             </a:extLst>
           </p:cNvPr>
@@ -13920,29 +13959,38 @@
             <p:ph type="title"/>
           </p:nvPr>
         </p:nvSpPr>
-        <p:spPr/>
-        <p:txBody>
-          <a:bodyPr/>
+        <p:spPr>
+          <a:xfrm>
+            <a:off x="838201" y="365125"/>
+            <a:ext cx="5393360" cy="1325563"/>
+          </a:xfrm>
+        </p:spPr>
+        <p:txBody>
+          <a:bodyPr vert="horz" lIns="91440" tIns="45720" rIns="91440" bIns="45720" rtlCol="0" anchor="ctr">
+            <a:normAutofit/>
+          </a:bodyPr>
           <a:lstStyle/>
           <a:p>
             <a:r>
-              <a:rPr lang="en-US" dirty="0">
+              <a:rPr lang="en-US" kern="1200" dirty="0">
                 <a:solidFill>
-                  <a:srgbClr val="FFFFFF"/>
+                  <a:schemeClr val="tx1"/>
                 </a:solidFill>
+                <a:latin typeface="+mj-lt"/>
+                <a:ea typeface="+mj-ea"/>
+                <a:cs typeface="+mj-cs"/>
               </a:rPr>
-              <a:t>Results Analysis</a:t>
+              <a:t>Data Cleanup, Before</a:t>
             </a:r>
-            <a:endParaRPr lang="en-US" dirty="0"/>
-          </a:p>
-        </p:txBody>
-      </p:sp>
-      <p:sp>
-        <p:nvSpPr>
-          <p:cNvPr id="3" name="Text Placeholder 2">
-            <a:extLst>
-              <a:ext uri="{FF2B5EF4-FFF2-40B4-BE49-F238E27FC236}">
-                <a16:creationId xmlns:a16="http://schemas.microsoft.com/office/drawing/2014/main" id="{9F49FB76-25BA-4481-B88D-DCB748E1662E}"/>
+          </a:p>
+        </p:txBody>
+      </p:sp>
+      <p:sp>
+        <p:nvSpPr>
+          <p:cNvPr id="16" name="Slide Number Placeholder 15">
+            <a:extLst>
+              <a:ext uri="{FF2B5EF4-FFF2-40B4-BE49-F238E27FC236}">
+                <a16:creationId xmlns:a16="http://schemas.microsoft.com/office/drawing/2014/main" id="{46EEA4F1-5FA3-4EBF-97F1-DF392077DB76}"/>
               </a:ext>
             </a:extLst>
           </p:cNvPr>
@@ -13950,32 +13998,199 @@
             <a:spLocks noGrp="1"/>
           </p:cNvSpPr>
           <p:nvPr>
-            <p:ph type="body" idx="1"/>
+            <p:ph type="sldNum" sz="quarter" idx="12"/>
           </p:nvPr>
         </p:nvSpPr>
-        <p:spPr/>
-        <p:txBody>
-          <a:bodyPr/>
+        <p:spPr>
+          <a:xfrm>
+            <a:off x="8610600" y="6356350"/>
+            <a:ext cx="2743200" cy="365125"/>
+          </a:xfrm>
+        </p:spPr>
+        <p:txBody>
+          <a:bodyPr vert="horz" lIns="91440" tIns="45720" rIns="91440" bIns="45720" rtlCol="0" anchor="ctr">
+            <a:normAutofit/>
+          </a:bodyPr>
           <a:lstStyle/>
           <a:p>
-            <a:r>
-              <a:rPr lang="en-US" dirty="0">
+            <a:pPr lvl="0">
+              <a:spcAft>
+                <a:spcPts val="600"/>
+              </a:spcAft>
+            </a:pPr>
+            <a:fld id="{D76B855D-E9CC-4FF8-AD85-6CDC7B89A0DE}" type="slidenum">
+              <a:rPr lang="en-US" noProof="0">
                 <a:solidFill>
-                  <a:srgbClr val="FFFFFF"/>
+                  <a:prstClr val="black">
+                    <a:tint val="75000"/>
+                  </a:prstClr>
                 </a:solidFill>
               </a:rPr>
-              <a:t>Subtitle</a:t>
+              <a:pPr lvl="0">
+                <a:spcAft>
+                  <a:spcPts val="600"/>
+                </a:spcAft>
+              </a:pPr>
+              <a:t>4</a:t>
+            </a:fld>
+            <a:endParaRPr lang="en-US" noProof="0">
+              <a:solidFill>
+                <a:prstClr val="black">
+                  <a:tint val="75000"/>
+                </a:prstClr>
+              </a:solidFill>
+            </a:endParaRPr>
+          </a:p>
+        </p:txBody>
+      </p:sp>
+      <p:pic>
+        <p:nvPicPr>
+          <p:cNvPr id="15" name="Picture 14" descr="A picture containing text, monitor, screenshot, screen&#10;&#10;Description automatically generated">
+            <a:extLst>
+              <a:ext uri="{FF2B5EF4-FFF2-40B4-BE49-F238E27FC236}">
+                <a16:creationId xmlns:a16="http://schemas.microsoft.com/office/drawing/2014/main" id="{BE4D65F5-9912-8F44-2D38-C487C76012F5}"/>
+              </a:ext>
+            </a:extLst>
+          </p:cNvPr>
+          <p:cNvPicPr>
+            <a:picLocks noChangeAspect="1"/>
+          </p:cNvPicPr>
+          <p:nvPr/>
+        </p:nvPicPr>
+        <p:blipFill>
+          <a:blip r:embed="rId2"/>
+          <a:stretch>
+            <a:fillRect/>
+          </a:stretch>
+        </p:blipFill>
+        <p:spPr>
+          <a:xfrm>
+            <a:off x="838200" y="1426660"/>
+            <a:ext cx="7772400" cy="2002340"/>
+          </a:xfrm>
+          <a:prstGeom prst="rect">
+            <a:avLst/>
+          </a:prstGeom>
+        </p:spPr>
+      </p:pic>
+      <p:pic>
+        <p:nvPicPr>
+          <p:cNvPr id="18" name="Picture 17" descr="Graphical user interface, application, background pattern&#10;&#10;Description automatically generated">
+            <a:extLst>
+              <a:ext uri="{FF2B5EF4-FFF2-40B4-BE49-F238E27FC236}">
+                <a16:creationId xmlns:a16="http://schemas.microsoft.com/office/drawing/2014/main" id="{23C22C0D-1A09-421E-3C04-0548F71BD10C}"/>
+              </a:ext>
+            </a:extLst>
+          </p:cNvPr>
+          <p:cNvPicPr>
+            <a:picLocks noChangeAspect="1"/>
+          </p:cNvPicPr>
+          <p:nvPr/>
+        </p:nvPicPr>
+        <p:blipFill>
+          <a:blip r:embed="rId3"/>
+          <a:stretch>
+            <a:fillRect/>
+          </a:stretch>
+        </p:blipFill>
+        <p:spPr>
+          <a:xfrm>
+            <a:off x="6231561" y="4601344"/>
+            <a:ext cx="6049108" cy="2033102"/>
+          </a:xfrm>
+          <a:prstGeom prst="rect">
+            <a:avLst/>
+          </a:prstGeom>
+        </p:spPr>
+      </p:pic>
+      <p:pic>
+        <p:nvPicPr>
+          <p:cNvPr id="20" name="Picture 19" descr="A black screen with white text&#10;&#10;Description automatically generated with low confidence">
+            <a:extLst>
+              <a:ext uri="{FF2B5EF4-FFF2-40B4-BE49-F238E27FC236}">
+                <a16:creationId xmlns:a16="http://schemas.microsoft.com/office/drawing/2014/main" id="{EBFC141B-EEE7-1199-174E-CC8EBFE81D47}"/>
+              </a:ext>
+            </a:extLst>
+          </p:cNvPr>
+          <p:cNvPicPr>
+            <a:picLocks noChangeAspect="1"/>
+          </p:cNvPicPr>
+          <p:nvPr/>
+        </p:nvPicPr>
+        <p:blipFill>
+          <a:blip r:embed="rId4"/>
+          <a:stretch>
+            <a:fillRect/>
+          </a:stretch>
+        </p:blipFill>
+        <p:spPr>
+          <a:xfrm>
+            <a:off x="838200" y="4841569"/>
+            <a:ext cx="5275385" cy="1697343"/>
+          </a:xfrm>
+          <a:prstGeom prst="rect">
+            <a:avLst/>
+          </a:prstGeom>
+        </p:spPr>
+      </p:pic>
+      <p:sp>
+        <p:nvSpPr>
+          <p:cNvPr id="26" name="Title 3">
+            <a:extLst>
+              <a:ext uri="{FF2B5EF4-FFF2-40B4-BE49-F238E27FC236}">
+                <a16:creationId xmlns:a16="http://schemas.microsoft.com/office/drawing/2014/main" id="{CB8A926D-C62A-AA5C-FFC5-E254D9374B8D}"/>
+              </a:ext>
+            </a:extLst>
+          </p:cNvPr>
+          <p:cNvSpPr txBox="1">
+            <a:spLocks/>
+          </p:cNvSpPr>
+          <p:nvPr/>
+        </p:nvSpPr>
+        <p:spPr>
+          <a:xfrm>
+            <a:off x="838200" y="3701939"/>
+            <a:ext cx="5393360" cy="1325563"/>
+          </a:xfrm>
+          <a:prstGeom prst="rect">
+            <a:avLst/>
+          </a:prstGeom>
+        </p:spPr>
+        <p:txBody>
+          <a:bodyPr vert="horz" lIns="91440" tIns="45720" rIns="91440" bIns="45720" rtlCol="0" anchor="ctr">
+            <a:normAutofit/>
+          </a:bodyPr>
+          <a:lstStyle>
+            <a:lvl1pPr algn="l" defTabSz="914400" rtl="0" eaLnBrk="1" latinLnBrk="0" hangingPunct="1">
+              <a:lnSpc>
+                <a:spcPct val="90000"/>
+              </a:lnSpc>
+              <a:spcBef>
+                <a:spcPct val="0"/>
+              </a:spcBef>
+              <a:buNone/>
+              <a:defRPr sz="4400" kern="1200">
+                <a:solidFill>
+                  <a:schemeClr val="tx1"/>
+                </a:solidFill>
+                <a:latin typeface="+mj-lt"/>
+                <a:ea typeface="+mj-ea"/>
+                <a:cs typeface="+mj-cs"/>
+              </a:defRPr>
+            </a:lvl1pPr>
+          </a:lstStyle>
+          <a:p>
+            <a:r>
+              <a:rPr lang="en-US" dirty="0"/>
+              <a:t>Data Cleanup, After</a:t>
             </a:r>
-          </a:p>
-          <a:p>
-            <a:endParaRPr lang="en-US" dirty="0"/>
           </a:p>
         </p:txBody>
       </p:sp>
     </p:spTree>
     <p:extLst>
       <p:ext uri="{BB962C8B-B14F-4D97-AF65-F5344CB8AC3E}">
-        <p14:creationId xmlns:p14="http://schemas.microsoft.com/office/powerpoint/2010/main" val="4283594893"/>
+        <p14:creationId xmlns:p14="http://schemas.microsoft.com/office/powerpoint/2010/main" val="2968695085"/>
       </p:ext>
     </p:extLst>
   </p:cSld>
@@ -14004,10 +14219,10 @@
       </p:grpSpPr>
       <p:sp>
         <p:nvSpPr>
-          <p:cNvPr id="11" name="Title 1">
-            <a:extLst>
-              <a:ext uri="{FF2B5EF4-FFF2-40B4-BE49-F238E27FC236}">
-                <a16:creationId xmlns:a16="http://schemas.microsoft.com/office/drawing/2014/main" id="{E78514DD-3FC6-4AEF-9C9C-057CF64C8E2D}"/>
+          <p:cNvPr id="2" name="Title 1">
+            <a:extLst>
+              <a:ext uri="{FF2B5EF4-FFF2-40B4-BE49-F238E27FC236}">
+                <a16:creationId xmlns:a16="http://schemas.microsoft.com/office/drawing/2014/main" id="{1EFC037F-9B04-45A9-8AE6-A8517884947F}"/>
               </a:ext>
             </a:extLst>
           </p:cNvPr>
@@ -14024,18 +14239,23 @@
           <a:lstStyle/>
           <a:p>
             <a:r>
-              <a:rPr lang="en-US" dirty="0"/>
-              <a:t>Logistic Regression</a:t>
+              <a:rPr lang="en-US" dirty="0">
+                <a:solidFill>
+                  <a:srgbClr val="FFFFFF"/>
+                </a:solidFill>
+              </a:rPr>
+              <a:t>Results Analysis</a:t>
             </a:r>
-          </a:p>
-        </p:txBody>
-      </p:sp>
-      <p:sp>
-        <p:nvSpPr>
-          <p:cNvPr id="13" name="Footer Placeholder 12">
-            <a:extLst>
-              <a:ext uri="{FF2B5EF4-FFF2-40B4-BE49-F238E27FC236}">
-                <a16:creationId xmlns:a16="http://schemas.microsoft.com/office/drawing/2014/main" id="{9B6754F1-BBB9-45C3-8F76-FA0E19B7463B}"/>
+            <a:endParaRPr lang="en-US" dirty="0"/>
+          </a:p>
+        </p:txBody>
+      </p:sp>
+      <p:sp>
+        <p:nvSpPr>
+          <p:cNvPr id="3" name="Text Placeholder 2">
+            <a:extLst>
+              <a:ext uri="{FF2B5EF4-FFF2-40B4-BE49-F238E27FC236}">
+                <a16:creationId xmlns:a16="http://schemas.microsoft.com/office/drawing/2014/main" id="{9F49FB76-25BA-4481-B88D-DCB748E1662E}"/>
               </a:ext>
             </a:extLst>
           </p:cNvPr>
@@ -14043,7 +14263,7 @@
             <a:spLocks noGrp="1"/>
           </p:cNvSpPr>
           <p:nvPr>
-            <p:ph type="ftr" sz="quarter" idx="11"/>
+            <p:ph type="body" idx="1"/>
           </p:nvPr>
         </p:nvSpPr>
         <p:spPr/>
@@ -14051,65 +14271,15 @@
           <a:bodyPr/>
           <a:lstStyle/>
           <a:p>
-            <a:pPr lvl="0"/>
             <a:r>
-              <a:rPr lang="en-US" noProof="0" dirty="0"/>
-              <a:t>Presentation Title</a:t>
+              <a:rPr lang="en-US" dirty="0">
+                <a:solidFill>
+                  <a:srgbClr val="FFFFFF"/>
+                </a:solidFill>
+              </a:rPr>
+              <a:t>Subtitle</a:t>
             </a:r>
           </a:p>
-        </p:txBody>
-      </p:sp>
-      <p:sp>
-        <p:nvSpPr>
-          <p:cNvPr id="14" name="Slide Number Placeholder 13">
-            <a:extLst>
-              <a:ext uri="{FF2B5EF4-FFF2-40B4-BE49-F238E27FC236}">
-                <a16:creationId xmlns:a16="http://schemas.microsoft.com/office/drawing/2014/main" id="{47FB0EFA-9228-4C2B-BC70-5B5C93771274}"/>
-              </a:ext>
-            </a:extLst>
-          </p:cNvPr>
-          <p:cNvSpPr>
-            <a:spLocks noGrp="1"/>
-          </p:cNvSpPr>
-          <p:nvPr>
-            <p:ph type="sldNum" sz="quarter" idx="12"/>
-          </p:nvPr>
-        </p:nvSpPr>
-        <p:spPr/>
-        <p:txBody>
-          <a:bodyPr/>
-          <a:lstStyle/>
-          <a:p>
-            <a:pPr lvl="0"/>
-            <a:fld id="{D76B855D-E9CC-4FF8-AD85-6CDC7B89A0DE}" type="slidenum">
-              <a:rPr lang="en-US" noProof="0" smtClean="0"/>
-              <a:pPr lvl="0"/>
-              <a:t>5</a:t>
-            </a:fld>
-            <a:endParaRPr lang="en-US" noProof="0" dirty="0"/>
-          </a:p>
-        </p:txBody>
-      </p:sp>
-      <p:sp>
-        <p:nvSpPr>
-          <p:cNvPr id="3" name="Content Placeholder 2">
-            <a:extLst>
-              <a:ext uri="{FF2B5EF4-FFF2-40B4-BE49-F238E27FC236}">
-                <a16:creationId xmlns:a16="http://schemas.microsoft.com/office/drawing/2014/main" id="{CE749291-D890-89F5-C058-B6B409F19D73}"/>
-              </a:ext>
-            </a:extLst>
-          </p:cNvPr>
-          <p:cNvSpPr>
-            <a:spLocks noGrp="1"/>
-          </p:cNvSpPr>
-          <p:nvPr>
-            <p:ph idx="1"/>
-          </p:nvPr>
-        </p:nvSpPr>
-        <p:spPr/>
-        <p:txBody>
-          <a:bodyPr/>
-          <a:lstStyle/>
           <a:p>
             <a:endParaRPr lang="en-US" dirty="0"/>
           </a:p>
@@ -14118,7 +14288,7 @@
     </p:spTree>
     <p:extLst>
       <p:ext uri="{BB962C8B-B14F-4D97-AF65-F5344CB8AC3E}">
-        <p14:creationId xmlns:p14="http://schemas.microsoft.com/office/powerpoint/2010/main" val="1019213662"/>
+        <p14:creationId xmlns:p14="http://schemas.microsoft.com/office/powerpoint/2010/main" val="4283594893"/>
       </p:ext>
     </p:extLst>
   </p:cSld>
@@ -14168,7 +14338,7 @@
           <a:p>
             <a:r>
               <a:rPr lang="en-US" dirty="0"/>
-              <a:t>Lasso/Ridge</a:t>
+              <a:t>Logistic Regression</a:t>
             </a:r>
           </a:p>
         </p:txBody>
@@ -14233,35 +14403,316 @@
           </a:p>
         </p:txBody>
       </p:sp>
-      <p:sp>
-        <p:nvSpPr>
-          <p:cNvPr id="3" name="Content Placeholder 2">
-            <a:extLst>
-              <a:ext uri="{FF2B5EF4-FFF2-40B4-BE49-F238E27FC236}">
-                <a16:creationId xmlns:a16="http://schemas.microsoft.com/office/drawing/2014/main" id="{CE749291-D890-89F5-C058-B6B409F19D73}"/>
-              </a:ext>
-            </a:extLst>
-          </p:cNvPr>
-          <p:cNvSpPr>
-            <a:spLocks noGrp="1"/>
-          </p:cNvSpPr>
+      <p:pic>
+        <p:nvPicPr>
+          <p:cNvPr id="6" name="Picture 5" descr="Text&#10;&#10;Description automatically generated">
+            <a:extLst>
+              <a:ext uri="{FF2B5EF4-FFF2-40B4-BE49-F238E27FC236}">
+                <a16:creationId xmlns:a16="http://schemas.microsoft.com/office/drawing/2014/main" id="{802D653F-BF9C-1751-5F6F-DFC6EFE016B9}"/>
+              </a:ext>
+            </a:extLst>
+          </p:cNvPr>
+          <p:cNvPicPr>
+            <a:picLocks noChangeAspect="1"/>
+          </p:cNvPicPr>
+          <p:nvPr/>
+        </p:nvPicPr>
+        <p:blipFill>
+          <a:blip r:embed="rId3"/>
+          <a:stretch>
+            <a:fillRect/>
+          </a:stretch>
+        </p:blipFill>
+        <p:spPr>
+          <a:xfrm>
+            <a:off x="539496" y="1549616"/>
+            <a:ext cx="2114182" cy="1413818"/>
+          </a:xfrm>
+          <a:prstGeom prst="rect">
+            <a:avLst/>
+          </a:prstGeom>
+        </p:spPr>
+      </p:pic>
+      <p:pic>
+        <p:nvPicPr>
+          <p:cNvPr id="8" name="Picture 7" descr="Chart, line chart&#10;&#10;Description automatically generated">
+            <a:extLst>
+              <a:ext uri="{FF2B5EF4-FFF2-40B4-BE49-F238E27FC236}">
+                <a16:creationId xmlns:a16="http://schemas.microsoft.com/office/drawing/2014/main" id="{A91F8E03-712B-FA2F-4AEA-758FECBEC295}"/>
+              </a:ext>
+            </a:extLst>
+          </p:cNvPr>
+          <p:cNvPicPr>
+            <a:picLocks noChangeAspect="1"/>
+          </p:cNvPicPr>
+          <p:nvPr/>
+        </p:nvPicPr>
+        <p:blipFill>
+          <a:blip r:embed="rId4"/>
+          <a:stretch>
+            <a:fillRect/>
+          </a:stretch>
+        </p:blipFill>
+        <p:spPr>
+          <a:xfrm>
+            <a:off x="290757" y="3065251"/>
+            <a:ext cx="2114182" cy="1602787"/>
+          </a:xfrm>
+          <a:prstGeom prst="rect">
+            <a:avLst/>
+          </a:prstGeom>
+        </p:spPr>
+      </p:pic>
+      <p:pic>
+        <p:nvPicPr>
+          <p:cNvPr id="10" name="Picture 9" descr="Chart, line chart, box and whisker chart&#10;&#10;Description automatically generated">
+            <a:extLst>
+              <a:ext uri="{FF2B5EF4-FFF2-40B4-BE49-F238E27FC236}">
+                <a16:creationId xmlns:a16="http://schemas.microsoft.com/office/drawing/2014/main" id="{698BC687-0E43-FBE2-8220-DD33FDF79FE9}"/>
+              </a:ext>
+            </a:extLst>
+          </p:cNvPr>
+          <p:cNvPicPr>
+            <a:picLocks noChangeAspect="1"/>
+          </p:cNvPicPr>
+          <p:nvPr/>
+        </p:nvPicPr>
+        <p:blipFill>
+          <a:blip r:embed="rId5"/>
+          <a:stretch>
+            <a:fillRect/>
+          </a:stretch>
+        </p:blipFill>
+        <p:spPr>
+          <a:xfrm>
+            <a:off x="2700805" y="3134673"/>
+            <a:ext cx="2021661" cy="1533365"/>
+          </a:xfrm>
+          <a:prstGeom prst="rect">
+            <a:avLst/>
+          </a:prstGeom>
+        </p:spPr>
+      </p:pic>
+      <p:pic>
+        <p:nvPicPr>
+          <p:cNvPr id="16" name="Picture 15" descr="Chart, treemap chart&#10;&#10;Description automatically generated">
+            <a:extLst>
+              <a:ext uri="{FF2B5EF4-FFF2-40B4-BE49-F238E27FC236}">
+                <a16:creationId xmlns:a16="http://schemas.microsoft.com/office/drawing/2014/main" id="{B98067FB-8BBC-32CD-08E5-208DB89FE4D3}"/>
+              </a:ext>
+            </a:extLst>
+          </p:cNvPr>
+          <p:cNvPicPr>
+            <a:picLocks noChangeAspect="1"/>
+          </p:cNvPicPr>
+          <p:nvPr/>
+        </p:nvPicPr>
+        <p:blipFill>
+          <a:blip r:embed="rId6"/>
+          <a:stretch>
+            <a:fillRect/>
+          </a:stretch>
+        </p:blipFill>
+        <p:spPr>
+          <a:xfrm>
+            <a:off x="1158889" y="4864378"/>
+            <a:ext cx="2183540" cy="1857097"/>
+          </a:xfrm>
+          <a:prstGeom prst="rect">
+            <a:avLst/>
+          </a:prstGeom>
+        </p:spPr>
+      </p:pic>
+      <p:pic>
+        <p:nvPicPr>
+          <p:cNvPr id="17" name="Content Placeholder 3" descr="Text&#10;&#10;Description automatically generated">
+            <a:extLst>
+              <a:ext uri="{FF2B5EF4-FFF2-40B4-BE49-F238E27FC236}">
+                <a16:creationId xmlns:a16="http://schemas.microsoft.com/office/drawing/2014/main" id="{A194A455-23DA-FD94-5A6E-401D6711D7B2}"/>
+              </a:ext>
+            </a:extLst>
+          </p:cNvPr>
+          <p:cNvPicPr>
+            <a:picLocks noGrp="1" noChangeAspect="1"/>
+          </p:cNvPicPr>
           <p:nvPr>
             <p:ph idx="1"/>
           </p:nvPr>
-        </p:nvSpPr>
-        <p:spPr/>
-        <p:txBody>
-          <a:bodyPr/>
+        </p:nvPicPr>
+        <p:blipFill>
+          <a:blip r:embed="rId7"/>
+          <a:stretch>
+            <a:fillRect/>
+          </a:stretch>
+        </p:blipFill>
+        <p:spPr>
+          <a:xfrm>
+            <a:off x="6152896" y="1690688"/>
+            <a:ext cx="4902200" cy="1473200"/>
+          </a:xfrm>
+        </p:spPr>
+      </p:pic>
+      <p:sp>
+        <p:nvSpPr>
+          <p:cNvPr id="18" name="TextBox 17">
+            <a:extLst>
+              <a:ext uri="{FF2B5EF4-FFF2-40B4-BE49-F238E27FC236}">
+                <a16:creationId xmlns:a16="http://schemas.microsoft.com/office/drawing/2014/main" id="{BE344A47-7A9F-C10B-1CF0-14D59B8FA7DA}"/>
+              </a:ext>
+            </a:extLst>
+          </p:cNvPr>
+          <p:cNvSpPr txBox="1"/>
+          <p:nvPr/>
+        </p:nvSpPr>
+        <p:spPr>
+          <a:xfrm>
+            <a:off x="8094486" y="1330323"/>
+            <a:ext cx="2960610" cy="369332"/>
+          </a:xfrm>
+          <a:prstGeom prst="rect">
+            <a:avLst/>
+          </a:prstGeom>
+          <a:noFill/>
+        </p:spPr>
+        <p:txBody>
+          <a:bodyPr wrap="square" rtlCol="0">
+            <a:spAutoFit/>
+          </a:bodyPr>
           <a:lstStyle/>
           <a:p>
-            <a:endParaRPr lang="en-US" dirty="0"/>
+            <a:pPr algn="r"/>
+            <a:r>
+              <a:rPr lang="en-US" dirty="0"/>
+              <a:t>Lasso</a:t>
+            </a:r>
+          </a:p>
+        </p:txBody>
+      </p:sp>
+      <p:sp>
+        <p:nvSpPr>
+          <p:cNvPr id="19" name="TextBox 18">
+            <a:extLst>
+              <a:ext uri="{FF2B5EF4-FFF2-40B4-BE49-F238E27FC236}">
+                <a16:creationId xmlns:a16="http://schemas.microsoft.com/office/drawing/2014/main" id="{AA8DD374-701C-BC9E-97A9-747B8999D625}"/>
+              </a:ext>
+            </a:extLst>
+          </p:cNvPr>
+          <p:cNvSpPr txBox="1"/>
+          <p:nvPr/>
+        </p:nvSpPr>
+        <p:spPr>
+          <a:xfrm>
+            <a:off x="8091822" y="3274968"/>
+            <a:ext cx="2960610" cy="369332"/>
+          </a:xfrm>
+          <a:prstGeom prst="rect">
+            <a:avLst/>
+          </a:prstGeom>
+          <a:noFill/>
+        </p:spPr>
+        <p:txBody>
+          <a:bodyPr wrap="square" rtlCol="0">
+            <a:spAutoFit/>
+          </a:bodyPr>
+          <a:lstStyle/>
+          <a:p>
+            <a:pPr algn="r"/>
+            <a:r>
+              <a:rPr lang="en-US" dirty="0"/>
+              <a:t>Ridge</a:t>
+            </a:r>
+          </a:p>
+        </p:txBody>
+      </p:sp>
+      <p:pic>
+        <p:nvPicPr>
+          <p:cNvPr id="20" name="Picture 19" descr="Text&#10;&#10;Description automatically generated">
+            <a:extLst>
+              <a:ext uri="{FF2B5EF4-FFF2-40B4-BE49-F238E27FC236}">
+                <a16:creationId xmlns:a16="http://schemas.microsoft.com/office/drawing/2014/main" id="{5537D132-AD55-38A9-BFDB-238AED1A9EE2}"/>
+              </a:ext>
+            </a:extLst>
+          </p:cNvPr>
+          <p:cNvPicPr>
+            <a:picLocks noChangeAspect="1"/>
+          </p:cNvPicPr>
+          <p:nvPr/>
+        </p:nvPicPr>
+        <p:blipFill>
+          <a:blip r:embed="rId8"/>
+          <a:stretch>
+            <a:fillRect/>
+          </a:stretch>
+        </p:blipFill>
+        <p:spPr>
+          <a:xfrm>
+            <a:off x="7555857" y="3678270"/>
+            <a:ext cx="3499239" cy="1547472"/>
+          </a:xfrm>
+          <a:prstGeom prst="rect">
+            <a:avLst/>
+          </a:prstGeom>
+        </p:spPr>
+      </p:pic>
+      <p:sp>
+        <p:nvSpPr>
+          <p:cNvPr id="21" name="Title 1">
+            <a:extLst>
+              <a:ext uri="{FF2B5EF4-FFF2-40B4-BE49-F238E27FC236}">
+                <a16:creationId xmlns:a16="http://schemas.microsoft.com/office/drawing/2014/main" id="{E8A3C260-86E6-849A-8810-55188DCDDD7B}"/>
+              </a:ext>
+            </a:extLst>
+          </p:cNvPr>
+          <p:cNvSpPr txBox="1">
+            <a:spLocks/>
+          </p:cNvSpPr>
+          <p:nvPr/>
+        </p:nvSpPr>
+        <p:spPr>
+          <a:xfrm>
+            <a:off x="691896" y="344877"/>
+            <a:ext cx="10515600" cy="1325563"/>
+          </a:xfrm>
+          <a:prstGeom prst="rect">
+            <a:avLst/>
+          </a:prstGeom>
+        </p:spPr>
+        <p:txBody>
+          <a:bodyPr vert="horz" lIns="91440" tIns="45720" rIns="91440" bIns="45720" rtlCol="0" anchor="ctr">
+            <a:normAutofit/>
+          </a:bodyPr>
+          <a:lstStyle>
+            <a:lvl1pPr algn="l" defTabSz="914400" rtl="0" eaLnBrk="1" latinLnBrk="0" hangingPunct="1">
+              <a:lnSpc>
+                <a:spcPct val="90000"/>
+              </a:lnSpc>
+              <a:spcBef>
+                <a:spcPct val="0"/>
+              </a:spcBef>
+              <a:buNone/>
+              <a:defRPr sz="4400" kern="1200">
+                <a:solidFill>
+                  <a:schemeClr val="tx1"/>
+                </a:solidFill>
+                <a:latin typeface="+mj-lt"/>
+                <a:ea typeface="+mj-ea"/>
+                <a:cs typeface="+mj-cs"/>
+              </a:defRPr>
+            </a:lvl1pPr>
+          </a:lstStyle>
+          <a:p>
+            <a:pPr algn="r"/>
+            <a:r>
+              <a:rPr lang="en-US" dirty="0"/>
+              <a:t>Lasso/Ridge</a:t>
+            </a:r>
           </a:p>
         </p:txBody>
       </p:sp>
     </p:spTree>
     <p:extLst>
       <p:ext uri="{BB962C8B-B14F-4D97-AF65-F5344CB8AC3E}">
-        <p14:creationId xmlns:p14="http://schemas.microsoft.com/office/powerpoint/2010/main" val="2175282623"/>
+        <p14:creationId xmlns:p14="http://schemas.microsoft.com/office/powerpoint/2010/main" val="1019213662"/>
       </p:ext>
     </p:extLst>
   </p:cSld>
@@ -14376,466 +14827,99 @@
           </a:p>
         </p:txBody>
       </p:sp>
-      <p:sp>
-        <p:nvSpPr>
-          <p:cNvPr id="3" name="Content Placeholder 2">
-            <a:extLst>
-              <a:ext uri="{FF2B5EF4-FFF2-40B4-BE49-F238E27FC236}">
-                <a16:creationId xmlns:a16="http://schemas.microsoft.com/office/drawing/2014/main" id="{CE749291-D890-89F5-C058-B6B409F19D73}"/>
-              </a:ext>
-            </a:extLst>
-          </p:cNvPr>
-          <p:cNvSpPr>
-            <a:spLocks noGrp="1"/>
-          </p:cNvSpPr>
+      <p:pic>
+        <p:nvPicPr>
+          <p:cNvPr id="4" name="Content Placeholder 3" descr="Chart, scatter chart&#10;&#10;Description automatically generated">
+            <a:extLst>
+              <a:ext uri="{FF2B5EF4-FFF2-40B4-BE49-F238E27FC236}">
+                <a16:creationId xmlns:a16="http://schemas.microsoft.com/office/drawing/2014/main" id="{39A176F5-F965-D282-1842-029A8A953E5C}"/>
+              </a:ext>
+            </a:extLst>
+          </p:cNvPr>
+          <p:cNvPicPr>
+            <a:picLocks noGrp="1" noChangeAspect="1"/>
+          </p:cNvPicPr>
           <p:nvPr>
             <p:ph idx="1"/>
           </p:nvPr>
-        </p:nvSpPr>
-        <p:spPr/>
-        <p:txBody>
-          <a:bodyPr/>
-          <a:lstStyle/>
-          <a:p>
-            <a:endParaRPr lang="en-US" dirty="0"/>
-          </a:p>
-        </p:txBody>
-      </p:sp>
+        </p:nvPicPr>
+        <p:blipFill>
+          <a:blip r:embed="rId3"/>
+          <a:stretch>
+            <a:fillRect/>
+          </a:stretch>
+        </p:blipFill>
+        <p:spPr>
+          <a:xfrm>
+            <a:off x="539496" y="1690689"/>
+            <a:ext cx="4114801" cy="3180138"/>
+          </a:xfrm>
+        </p:spPr>
+      </p:pic>
+      <p:pic>
+        <p:nvPicPr>
+          <p:cNvPr id="6" name="Picture 5" descr="Chart, scatter chart&#10;&#10;Description automatically generated">
+            <a:extLst>
+              <a:ext uri="{FF2B5EF4-FFF2-40B4-BE49-F238E27FC236}">
+                <a16:creationId xmlns:a16="http://schemas.microsoft.com/office/drawing/2014/main" id="{880D8124-0ADE-0391-A9ED-BF9D9DB11585}"/>
+              </a:ext>
+            </a:extLst>
+          </p:cNvPr>
+          <p:cNvPicPr>
+            <a:picLocks noChangeAspect="1"/>
+          </p:cNvPicPr>
+          <p:nvPr/>
+        </p:nvPicPr>
+        <p:blipFill>
+          <a:blip r:embed="rId4"/>
+          <a:stretch>
+            <a:fillRect/>
+          </a:stretch>
+        </p:blipFill>
+        <p:spPr>
+          <a:xfrm>
+            <a:off x="5656669" y="1690688"/>
+            <a:ext cx="4993461" cy="3086466"/>
+          </a:xfrm>
+          <a:prstGeom prst="rect">
+            <a:avLst/>
+          </a:prstGeom>
+        </p:spPr>
+      </p:pic>
+      <p:pic>
+        <p:nvPicPr>
+          <p:cNvPr id="8" name="Picture 7">
+            <a:extLst>
+              <a:ext uri="{FF2B5EF4-FFF2-40B4-BE49-F238E27FC236}">
+                <a16:creationId xmlns:a16="http://schemas.microsoft.com/office/drawing/2014/main" id="{B624D1D6-D474-C0F9-9004-1E7C3564ECD3}"/>
+              </a:ext>
+            </a:extLst>
+          </p:cNvPr>
+          <p:cNvPicPr>
+            <a:picLocks noChangeAspect="1"/>
+          </p:cNvPicPr>
+          <p:nvPr/>
+        </p:nvPicPr>
+        <p:blipFill>
+          <a:blip r:embed="rId5"/>
+          <a:stretch>
+            <a:fillRect/>
+          </a:stretch>
+        </p:blipFill>
+        <p:spPr>
+          <a:xfrm>
+            <a:off x="661599" y="5185752"/>
+            <a:ext cx="5727700" cy="381000"/>
+          </a:xfrm>
+          <a:prstGeom prst="rect">
+            <a:avLst/>
+          </a:prstGeom>
+        </p:spPr>
+      </p:pic>
     </p:spTree>
     <p:extLst>
       <p:ext uri="{BB962C8B-B14F-4D97-AF65-F5344CB8AC3E}">
         <p14:creationId xmlns:p14="http://schemas.microsoft.com/office/powerpoint/2010/main" val="3202388243"/>
-      </p:ext>
-    </p:extLst>
-  </p:cSld>
-  <p:clrMapOvr>
-    <a:masterClrMapping/>
-  </p:clrMapOvr>
-</p:sld>
-</file>
-
-<file path=ppt/slides/slide8.xml><?xml version="1.0" encoding="utf-8"?>
-<p:sld xmlns:a="http://schemas.openxmlformats.org/drawingml/2006/main" xmlns:r="http://schemas.openxmlformats.org/officeDocument/2006/relationships" xmlns:p="http://schemas.openxmlformats.org/presentationml/2006/main">
-  <p:cSld>
-    <p:spTree>
-      <p:nvGrpSpPr>
-        <p:cNvPr id="1" name=""/>
-        <p:cNvGrpSpPr/>
-        <p:nvPr/>
-      </p:nvGrpSpPr>
-      <p:grpSpPr>
-        <a:xfrm>
-          <a:off x="0" y="0"/>
-          <a:ext cx="0" cy="0"/>
-          <a:chOff x="0" y="0"/>
-          <a:chExt cx="0" cy="0"/>
-        </a:xfrm>
-      </p:grpSpPr>
-      <p:sp>
-        <p:nvSpPr>
-          <p:cNvPr id="11" name="Title 1">
-            <a:extLst>
-              <a:ext uri="{FF2B5EF4-FFF2-40B4-BE49-F238E27FC236}">
-                <a16:creationId xmlns:a16="http://schemas.microsoft.com/office/drawing/2014/main" id="{E78514DD-3FC6-4AEF-9C9C-057CF64C8E2D}"/>
-              </a:ext>
-            </a:extLst>
-          </p:cNvPr>
-          <p:cNvSpPr>
-            <a:spLocks noGrp="1"/>
-          </p:cNvSpPr>
-          <p:nvPr>
-            <p:ph type="title"/>
-          </p:nvPr>
-        </p:nvSpPr>
-        <p:spPr/>
-        <p:txBody>
-          <a:bodyPr/>
-          <a:lstStyle/>
-          <a:p>
-            <a:r>
-              <a:rPr lang="en-US" dirty="0"/>
-              <a:t>Comparison Charts</a:t>
-            </a:r>
-          </a:p>
-        </p:txBody>
-      </p:sp>
-      <p:sp>
-        <p:nvSpPr>
-          <p:cNvPr id="13" name="Footer Placeholder 12">
-            <a:extLst>
-              <a:ext uri="{FF2B5EF4-FFF2-40B4-BE49-F238E27FC236}">
-                <a16:creationId xmlns:a16="http://schemas.microsoft.com/office/drawing/2014/main" id="{9B6754F1-BBB9-45C3-8F76-FA0E19B7463B}"/>
-              </a:ext>
-            </a:extLst>
-          </p:cNvPr>
-          <p:cNvSpPr>
-            <a:spLocks noGrp="1"/>
-          </p:cNvSpPr>
-          <p:nvPr>
-            <p:ph type="ftr" sz="quarter" idx="11"/>
-          </p:nvPr>
-        </p:nvSpPr>
-        <p:spPr/>
-        <p:txBody>
-          <a:bodyPr/>
-          <a:lstStyle/>
-          <a:p>
-            <a:pPr lvl="0"/>
-            <a:r>
-              <a:rPr lang="en-US" noProof="0" dirty="0"/>
-              <a:t>Presentation Title</a:t>
-            </a:r>
-          </a:p>
-        </p:txBody>
-      </p:sp>
-      <p:sp>
-        <p:nvSpPr>
-          <p:cNvPr id="14" name="Slide Number Placeholder 13">
-            <a:extLst>
-              <a:ext uri="{FF2B5EF4-FFF2-40B4-BE49-F238E27FC236}">
-                <a16:creationId xmlns:a16="http://schemas.microsoft.com/office/drawing/2014/main" id="{47FB0EFA-9228-4C2B-BC70-5B5C93771274}"/>
-              </a:ext>
-            </a:extLst>
-          </p:cNvPr>
-          <p:cNvSpPr>
-            <a:spLocks noGrp="1"/>
-          </p:cNvSpPr>
-          <p:nvPr>
-            <p:ph type="sldNum" sz="quarter" idx="12"/>
-          </p:nvPr>
-        </p:nvSpPr>
-        <p:spPr/>
-        <p:txBody>
-          <a:bodyPr/>
-          <a:lstStyle/>
-          <a:p>
-            <a:pPr lvl="0"/>
-            <a:fld id="{D76B855D-E9CC-4FF8-AD85-6CDC7B89A0DE}" type="slidenum">
-              <a:rPr lang="en-US" noProof="0" smtClean="0"/>
-              <a:pPr lvl="0"/>
-              <a:t>8</a:t>
-            </a:fld>
-            <a:endParaRPr lang="en-US" noProof="0" dirty="0"/>
-          </a:p>
-        </p:txBody>
-      </p:sp>
-      <p:sp>
-        <p:nvSpPr>
-          <p:cNvPr id="3" name="Content Placeholder 2">
-            <a:extLst>
-              <a:ext uri="{FF2B5EF4-FFF2-40B4-BE49-F238E27FC236}">
-                <a16:creationId xmlns:a16="http://schemas.microsoft.com/office/drawing/2014/main" id="{CE749291-D890-89F5-C058-B6B409F19D73}"/>
-              </a:ext>
-            </a:extLst>
-          </p:cNvPr>
-          <p:cNvSpPr>
-            <a:spLocks noGrp="1"/>
-          </p:cNvSpPr>
-          <p:nvPr>
-            <p:ph idx="1"/>
-          </p:nvPr>
-        </p:nvSpPr>
-        <p:spPr/>
-        <p:txBody>
-          <a:bodyPr/>
-          <a:lstStyle/>
-          <a:p>
-            <a:endParaRPr lang="en-US" dirty="0"/>
-          </a:p>
-        </p:txBody>
-      </p:sp>
-    </p:spTree>
-    <p:extLst>
-      <p:ext uri="{BB962C8B-B14F-4D97-AF65-F5344CB8AC3E}">
-        <p14:creationId xmlns:p14="http://schemas.microsoft.com/office/powerpoint/2010/main" val="3746296655"/>
-      </p:ext>
-    </p:extLst>
-  </p:cSld>
-  <p:clrMapOvr>
-    <a:masterClrMapping/>
-  </p:clrMapOvr>
-</p:sld>
-</file>
-
-<file path=ppt/slides/slide9.xml><?xml version="1.0" encoding="utf-8"?>
-<p:sld xmlns:a="http://schemas.openxmlformats.org/drawingml/2006/main" xmlns:r="http://schemas.openxmlformats.org/officeDocument/2006/relationships" xmlns:p="http://schemas.openxmlformats.org/presentationml/2006/main">
-  <p:cSld>
-    <p:spTree>
-      <p:nvGrpSpPr>
-        <p:cNvPr id="1" name=""/>
-        <p:cNvGrpSpPr/>
-        <p:nvPr/>
-      </p:nvGrpSpPr>
-      <p:grpSpPr>
-        <a:xfrm>
-          <a:off x="0" y="0"/>
-          <a:ext cx="0" cy="0"/>
-          <a:chOff x="0" y="0"/>
-          <a:chExt cx="0" cy="0"/>
-        </a:xfrm>
-      </p:grpSpPr>
-      <p:sp>
-        <p:nvSpPr>
-          <p:cNvPr id="4" name="Title 3">
-            <a:extLst>
-              <a:ext uri="{FF2B5EF4-FFF2-40B4-BE49-F238E27FC236}">
-                <a16:creationId xmlns:a16="http://schemas.microsoft.com/office/drawing/2014/main" id="{E45C6405-9D6C-48F5-9EFB-4CF1F3193EA4}"/>
-              </a:ext>
-            </a:extLst>
-          </p:cNvPr>
-          <p:cNvSpPr>
-            <a:spLocks noGrp="1"/>
-          </p:cNvSpPr>
-          <p:nvPr>
-            <p:ph type="title"/>
-          </p:nvPr>
-        </p:nvSpPr>
-        <p:spPr/>
-        <p:txBody>
-          <a:bodyPr/>
-          <a:lstStyle/>
-          <a:p>
-            <a:r>
-              <a:rPr lang="en-US" dirty="0"/>
-              <a:t>Summary</a:t>
-            </a:r>
-          </a:p>
-        </p:txBody>
-      </p:sp>
-      <p:sp>
-        <p:nvSpPr>
-          <p:cNvPr id="5" name="Content Placeholder 4">
-            <a:extLst>
-              <a:ext uri="{FF2B5EF4-FFF2-40B4-BE49-F238E27FC236}">
-                <a16:creationId xmlns:a16="http://schemas.microsoft.com/office/drawing/2014/main" id="{42E3A3A9-5E96-4CDD-A971-9C272EFD97D9}"/>
-              </a:ext>
-            </a:extLst>
-          </p:cNvPr>
-          <p:cNvSpPr>
-            <a:spLocks noGrp="1"/>
-          </p:cNvSpPr>
-          <p:nvPr>
-            <p:ph idx="1"/>
-          </p:nvPr>
-        </p:nvSpPr>
-        <p:spPr/>
-        <p:txBody>
-          <a:bodyPr/>
-          <a:lstStyle/>
-          <a:p>
-            <a:r>
-              <a:rPr lang="en-US" sz="2400" dirty="0"/>
-              <a:t>With PowerPoint, you can create presentations and share your work with others, wherever they are. Type the text you want here to get started. You can also add images, art, and videos on this template. Save to OneDrive and access your presentations from your computer, tablet, or phone. </a:t>
-            </a:r>
-          </a:p>
-          <a:p>
-            <a:endParaRPr lang="en-US" dirty="0"/>
-          </a:p>
-        </p:txBody>
-      </p:sp>
-      <p:pic>
-        <p:nvPicPr>
-          <p:cNvPr id="9" name="Picture Placeholder 8" descr="boy playing with space ship toys">
-            <a:extLst>
-              <a:ext uri="{FF2B5EF4-FFF2-40B4-BE49-F238E27FC236}">
-                <a16:creationId xmlns:a16="http://schemas.microsoft.com/office/drawing/2014/main" id="{BB00A97C-4C32-42DA-9838-F3D341AB0DCC}"/>
-              </a:ext>
-            </a:extLst>
-          </p:cNvPr>
-          <p:cNvPicPr>
-            <a:picLocks noGrp="1" noChangeAspect="1"/>
-          </p:cNvPicPr>
-          <p:nvPr>
-            <p:ph type="pic" sz="quarter" idx="13"/>
-          </p:nvPr>
-        </p:nvPicPr>
-        <p:blipFill rotWithShape="1">
-          <a:blip r:embed="rId2"/>
-          <a:srcRect l="20" r="20"/>
-          <a:stretch/>
-        </p:blipFill>
-        <p:spPr/>
-      </p:pic>
-      <p:pic>
-        <p:nvPicPr>
-          <p:cNvPr id="11" name="Picture Placeholder 10" descr="little girl sitting on steps reading a book">
-            <a:extLst>
-              <a:ext uri="{FF2B5EF4-FFF2-40B4-BE49-F238E27FC236}">
-                <a16:creationId xmlns:a16="http://schemas.microsoft.com/office/drawing/2014/main" id="{89C83A94-9400-40DF-9CE0-AFEB3C742BC3}"/>
-              </a:ext>
-            </a:extLst>
-          </p:cNvPr>
-          <p:cNvPicPr>
-            <a:picLocks noGrp="1" noChangeAspect="1"/>
-          </p:cNvPicPr>
-          <p:nvPr>
-            <p:ph type="pic" sz="quarter" idx="14"/>
-          </p:nvPr>
-        </p:nvPicPr>
-        <p:blipFill rotWithShape="1">
-          <a:blip r:embed="rId3"/>
-          <a:srcRect t="23" b="23"/>
-          <a:stretch/>
-        </p:blipFill>
-        <p:spPr/>
-      </p:pic>
-      <p:sp>
-        <p:nvSpPr>
-          <p:cNvPr id="13" name="Footer Placeholder 12">
-            <a:extLst>
-              <a:ext uri="{FF2B5EF4-FFF2-40B4-BE49-F238E27FC236}">
-                <a16:creationId xmlns:a16="http://schemas.microsoft.com/office/drawing/2014/main" id="{E0C27B2A-1D72-43E3-82D3-29739485AA73}"/>
-              </a:ext>
-            </a:extLst>
-          </p:cNvPr>
-          <p:cNvSpPr>
-            <a:spLocks noGrp="1"/>
-          </p:cNvSpPr>
-          <p:nvPr>
-            <p:ph type="ftr" sz="quarter" idx="11"/>
-          </p:nvPr>
-        </p:nvSpPr>
-        <p:spPr/>
-        <p:txBody>
-          <a:bodyPr/>
-          <a:lstStyle/>
-          <a:p>
-            <a:pPr marL="0" marR="0" lvl="0" indent="0" algn="ctr" defTabSz="914400" rtl="0" eaLnBrk="1" fontAlgn="auto" latinLnBrk="0" hangingPunct="1">
-              <a:lnSpc>
-                <a:spcPct val="100000"/>
-              </a:lnSpc>
-              <a:spcBef>
-                <a:spcPts val="0"/>
-              </a:spcBef>
-              <a:spcAft>
-                <a:spcPts val="0"/>
-              </a:spcAft>
-              <a:buClrTx/>
-              <a:buSzTx/>
-              <a:buFontTx/>
-              <a:buNone/>
-              <a:tabLst/>
-              <a:defRPr/>
-            </a:pPr>
-            <a:r>
-              <a:rPr kumimoji="0" lang="en-US" sz="1200" b="0" i="0" u="none" strike="noStrike" kern="1200" cap="none" spc="0" normalizeH="0" baseline="0" noProof="0" dirty="0">
-                <a:ln>
-                  <a:noFill/>
-                </a:ln>
-                <a:solidFill>
-                  <a:prstClr val="black">
-                    <a:tint val="75000"/>
-                  </a:prstClr>
-                </a:solidFill>
-                <a:effectLst/>
-                <a:uLnTx/>
-                <a:uFillTx/>
-                <a:latin typeface="Calibri" panose="020F0502020204030204"/>
-                <a:ea typeface="+mn-ea"/>
-                <a:cs typeface="+mn-cs"/>
-              </a:rPr>
-              <a:t>Presentation Title</a:t>
-            </a:r>
-          </a:p>
-        </p:txBody>
-      </p:sp>
-      <p:sp>
-        <p:nvSpPr>
-          <p:cNvPr id="14" name="Slide Number Placeholder 13">
-            <a:extLst>
-              <a:ext uri="{FF2B5EF4-FFF2-40B4-BE49-F238E27FC236}">
-                <a16:creationId xmlns:a16="http://schemas.microsoft.com/office/drawing/2014/main" id="{DC4D09A1-D96F-4BFC-8475-2F079EAD8652}"/>
-              </a:ext>
-            </a:extLst>
-          </p:cNvPr>
-          <p:cNvSpPr>
-            <a:spLocks noGrp="1"/>
-          </p:cNvSpPr>
-          <p:nvPr>
-            <p:ph type="sldNum" sz="quarter" idx="12"/>
-          </p:nvPr>
-        </p:nvSpPr>
-        <p:spPr/>
-        <p:txBody>
-          <a:bodyPr/>
-          <a:lstStyle/>
-          <a:p>
-            <a:pPr marL="0" marR="0" lvl="0" indent="0" algn="r" defTabSz="914400" rtl="0" eaLnBrk="1" fontAlgn="auto" latinLnBrk="0" hangingPunct="1">
-              <a:lnSpc>
-                <a:spcPct val="100000"/>
-              </a:lnSpc>
-              <a:spcBef>
-                <a:spcPts val="0"/>
-              </a:spcBef>
-              <a:spcAft>
-                <a:spcPts val="0"/>
-              </a:spcAft>
-              <a:buClrTx/>
-              <a:buSzTx/>
-              <a:buFontTx/>
-              <a:buNone/>
-              <a:tabLst/>
-              <a:defRPr/>
-            </a:pPr>
-            <a:fld id="{D76B855D-E9CC-4FF8-AD85-6CDC7B89A0DE}" type="slidenum">
-              <a:rPr kumimoji="0" lang="en-US" sz="1200" b="0" i="0" u="none" strike="noStrike" kern="1200" cap="none" spc="0" normalizeH="0" baseline="0" noProof="0" smtClean="0">
-                <a:ln>
-                  <a:noFill/>
-                </a:ln>
-                <a:solidFill>
-                  <a:prstClr val="black">
-                    <a:tint val="75000"/>
-                  </a:prstClr>
-                </a:solidFill>
-                <a:effectLst/>
-                <a:uLnTx/>
-                <a:uFillTx/>
-                <a:latin typeface="Calibri" panose="020F0502020204030204"/>
-                <a:ea typeface="+mn-ea"/>
-                <a:cs typeface="+mn-cs"/>
-              </a:rPr>
-              <a:pPr marL="0" marR="0" lvl="0" indent="0" algn="r" defTabSz="914400" rtl="0" eaLnBrk="1" fontAlgn="auto" latinLnBrk="0" hangingPunct="1">
-                <a:lnSpc>
-                  <a:spcPct val="100000"/>
-                </a:lnSpc>
-                <a:spcBef>
-                  <a:spcPts val="0"/>
-                </a:spcBef>
-                <a:spcAft>
-                  <a:spcPts val="0"/>
-                </a:spcAft>
-                <a:buClrTx/>
-                <a:buSzTx/>
-                <a:buFontTx/>
-                <a:buNone/>
-                <a:tabLst/>
-                <a:defRPr/>
-              </a:pPr>
-              <a:t>9</a:t>
-            </a:fld>
-            <a:endParaRPr kumimoji="0" lang="en-US" sz="1200" b="0" i="0" u="none" strike="noStrike" kern="1200" cap="none" spc="0" normalizeH="0" baseline="0" noProof="0" dirty="0">
-              <a:ln>
-                <a:noFill/>
-              </a:ln>
-              <a:solidFill>
-                <a:prstClr val="black">
-                  <a:tint val="75000"/>
-                </a:prstClr>
-              </a:solidFill>
-              <a:effectLst/>
-              <a:uLnTx/>
-              <a:uFillTx/>
-              <a:latin typeface="Calibri" panose="020F0502020204030204"/>
-              <a:ea typeface="+mn-ea"/>
-              <a:cs typeface="+mn-cs"/>
-            </a:endParaRPr>
-          </a:p>
-        </p:txBody>
-      </p:sp>
-    </p:spTree>
-    <p:extLst>
-      <p:ext uri="{BB962C8B-B14F-4D97-AF65-F5344CB8AC3E}">
-        <p14:creationId xmlns:p14="http://schemas.microsoft.com/office/powerpoint/2010/main" val="17839761"/>
       </p:ext>
     </p:extLst>
   </p:cSld>

</xml_diff>